<commit_message>
building blocks for sphinx docs
</commit_message>
<xml_diff>
--- a/wgrib2-logo.pptx
+++ b/wgrib2-logo.pptx
@@ -4483,6 +4483,346 @@
           </a:p>
         </p:txBody>
       </p:sp>
+      <p:grpSp>
+        <p:nvGrpSpPr>
+          <p:cNvPr id="9" name="Group 8">
+            <a:extLst>
+              <a:ext uri="{FF2B5EF4-FFF2-40B4-BE49-F238E27FC236}">
+                <a16:creationId xmlns:a16="http://schemas.microsoft.com/office/drawing/2014/main" id="{FC7DB7AD-B324-A510-EB26-CA87D94D6123}"/>
+              </a:ext>
+            </a:extLst>
+          </p:cNvPr>
+          <p:cNvGrpSpPr/>
+          <p:nvPr/>
+        </p:nvGrpSpPr>
+        <p:grpSpPr>
+          <a:xfrm>
+            <a:off x="1096966" y="3914427"/>
+            <a:ext cx="1838960" cy="2062163"/>
+            <a:chOff x="5372100" y="4028230"/>
+            <a:chExt cx="1838960" cy="2062163"/>
+          </a:xfrm>
+        </p:grpSpPr>
+        <p:sp>
+          <p:nvSpPr>
+            <p:cNvPr id="10" name="Rectangle: Rounded Corners 9">
+              <a:extLst>
+                <a:ext uri="{FF2B5EF4-FFF2-40B4-BE49-F238E27FC236}">
+                  <a16:creationId xmlns:a16="http://schemas.microsoft.com/office/drawing/2014/main" id="{EA09A2B6-AF38-9E14-24D0-4EA09FB8D840}"/>
+                </a:ext>
+              </a:extLst>
+            </p:cNvPr>
+            <p:cNvSpPr/>
+            <p:nvPr/>
+          </p:nvSpPr>
+          <p:spPr>
+            <a:xfrm>
+              <a:off x="5372100" y="4575283"/>
+              <a:ext cx="1838960" cy="1515110"/>
+            </a:xfrm>
+            <a:prstGeom prst="roundRect">
+              <a:avLst/>
+            </a:prstGeom>
+            <a:gradFill flip="none" rotWithShape="1">
+              <a:gsLst>
+                <a:gs pos="0">
+                  <a:srgbClr val="263041"/>
+                </a:gs>
+                <a:gs pos="100000">
+                  <a:srgbClr val="30679A"/>
+                </a:gs>
+              </a:gsLst>
+              <a:path path="circle">
+                <a:fillToRect l="100000" t="100000"/>
+              </a:path>
+              <a:tileRect r="-100000" b="-100000"/>
+            </a:gradFill>
+            <a:ln>
+              <a:noFill/>
+            </a:ln>
+            <a:scene3d>
+              <a:camera prst="isometricOffAxis2Top">
+                <a:rot lat="18000000" lon="3600000" rev="18000000"/>
+              </a:camera>
+              <a:lightRig rig="soft" dir="t">
+                <a:rot lat="0" lon="0" rev="3600000"/>
+              </a:lightRig>
+            </a:scene3d>
+            <a:sp3d extrusionH="127000" prstMaterial="matte">
+              <a:bevelT w="0" h="0"/>
+              <a:bevelB w="0" h="0"/>
+            </a:sp3d>
+          </p:spPr>
+          <p:style>
+            <a:lnRef idx="2">
+              <a:schemeClr val="accent1">
+                <a:shade val="50000"/>
+              </a:schemeClr>
+            </a:lnRef>
+            <a:fillRef idx="1">
+              <a:schemeClr val="accent1"/>
+            </a:fillRef>
+            <a:effectRef idx="0">
+              <a:schemeClr val="accent1"/>
+            </a:effectRef>
+            <a:fontRef idx="minor">
+              <a:schemeClr val="lt1"/>
+            </a:fontRef>
+          </p:style>
+          <p:txBody>
+            <a:bodyPr rtlCol="0" anchor="ctr"/>
+            <a:lstStyle/>
+            <a:p>
+              <a:pPr algn="ctr"/>
+              <a:endParaRPr lang="en-US"/>
+            </a:p>
+          </p:txBody>
+        </p:sp>
+        <p:grpSp>
+          <p:nvGrpSpPr>
+            <p:cNvPr id="11" name="Group 10">
+              <a:extLst>
+                <a:ext uri="{FF2B5EF4-FFF2-40B4-BE49-F238E27FC236}">
+                  <a16:creationId xmlns:a16="http://schemas.microsoft.com/office/drawing/2014/main" id="{FF47E6F0-D979-AB6D-22CD-F17A4D6ED939}"/>
+                </a:ext>
+              </a:extLst>
+            </p:cNvPr>
+            <p:cNvGrpSpPr/>
+            <p:nvPr/>
+          </p:nvGrpSpPr>
+          <p:grpSpPr>
+            <a:xfrm>
+              <a:off x="5372100" y="4028230"/>
+              <a:ext cx="1838960" cy="1788637"/>
+              <a:chOff x="4549140" y="845857"/>
+              <a:chExt cx="1838960" cy="1788637"/>
+            </a:xfrm>
+          </p:grpSpPr>
+          <p:sp>
+            <p:nvSpPr>
+              <p:cNvPr id="12" name="Rectangle: Rounded Corners 11">
+                <a:extLst>
+                  <a:ext uri="{FF2B5EF4-FFF2-40B4-BE49-F238E27FC236}">
+                    <a16:creationId xmlns:a16="http://schemas.microsoft.com/office/drawing/2014/main" id="{8D016415-7AF8-2ED9-C371-53F8F7706564}"/>
+                  </a:ext>
+                </a:extLst>
+              </p:cNvPr>
+              <p:cNvSpPr/>
+              <p:nvPr/>
+            </p:nvSpPr>
+            <p:spPr>
+              <a:xfrm>
+                <a:off x="4549140" y="1119384"/>
+                <a:ext cx="1838960" cy="1515110"/>
+              </a:xfrm>
+              <a:prstGeom prst="roundRect">
+                <a:avLst/>
+              </a:prstGeom>
+              <a:gradFill flip="none" rotWithShape="1">
+                <a:gsLst>
+                  <a:gs pos="0">
+                    <a:srgbClr val="119DA4"/>
+                  </a:gs>
+                  <a:gs pos="100000">
+                    <a:srgbClr val="15C0C9"/>
+                  </a:gs>
+                </a:gsLst>
+                <a:path path="circle">
+                  <a:fillToRect l="100000" t="100000"/>
+                </a:path>
+                <a:tileRect r="-100000" b="-100000"/>
+              </a:gradFill>
+              <a:ln>
+                <a:noFill/>
+              </a:ln>
+              <a:scene3d>
+                <a:camera prst="isometricOffAxis2Top">
+                  <a:rot lat="18000000" lon="3600000" rev="18000000"/>
+                </a:camera>
+                <a:lightRig rig="soft" dir="t">
+                  <a:rot lat="0" lon="0" rev="3600000"/>
+                </a:lightRig>
+              </a:scene3d>
+              <a:sp3d extrusionH="127000" prstMaterial="matte">
+                <a:bevelT w="0" h="0"/>
+                <a:bevelB w="0" h="0"/>
+              </a:sp3d>
+            </p:spPr>
+            <p:style>
+              <a:lnRef idx="2">
+                <a:schemeClr val="accent1">
+                  <a:shade val="50000"/>
+                </a:schemeClr>
+              </a:lnRef>
+              <a:fillRef idx="1">
+                <a:schemeClr val="accent1"/>
+              </a:fillRef>
+              <a:effectRef idx="0">
+                <a:schemeClr val="accent1"/>
+              </a:effectRef>
+              <a:fontRef idx="minor">
+                <a:schemeClr val="lt1"/>
+              </a:fontRef>
+            </p:style>
+            <p:txBody>
+              <a:bodyPr rtlCol="0" anchor="ctr"/>
+              <a:lstStyle/>
+              <a:p>
+                <a:pPr algn="ctr"/>
+                <a:endParaRPr lang="en-US"/>
+              </a:p>
+            </p:txBody>
+          </p:sp>
+          <p:sp>
+            <p:nvSpPr>
+              <p:cNvPr id="13" name="Rectangle: Rounded Corners 12">
+                <a:extLst>
+                  <a:ext uri="{FF2B5EF4-FFF2-40B4-BE49-F238E27FC236}">
+                    <a16:creationId xmlns:a16="http://schemas.microsoft.com/office/drawing/2014/main" id="{DEE314E3-5407-2D65-0785-02F3E693E0CF}"/>
+                  </a:ext>
+                </a:extLst>
+              </p:cNvPr>
+              <p:cNvSpPr/>
+              <p:nvPr/>
+            </p:nvSpPr>
+            <p:spPr>
+              <a:xfrm>
+                <a:off x="4549140" y="845857"/>
+                <a:ext cx="1838960" cy="1515110"/>
+              </a:xfrm>
+              <a:prstGeom prst="roundRect">
+                <a:avLst/>
+              </a:prstGeom>
+              <a:gradFill flip="none" rotWithShape="1">
+                <a:gsLst>
+                  <a:gs pos="0">
+                    <a:srgbClr val="263041"/>
+                  </a:gs>
+                  <a:gs pos="100000">
+                    <a:srgbClr val="30679A"/>
+                  </a:gs>
+                </a:gsLst>
+                <a:path path="circle">
+                  <a:fillToRect l="100000" t="100000"/>
+                </a:path>
+                <a:tileRect r="-100000" b="-100000"/>
+              </a:gradFill>
+              <a:ln>
+                <a:noFill/>
+              </a:ln>
+              <a:scene3d>
+                <a:camera prst="isometricOffAxis2Top">
+                  <a:rot lat="18000000" lon="3600000" rev="18000000"/>
+                </a:camera>
+                <a:lightRig rig="soft" dir="t">
+                  <a:rot lat="0" lon="0" rev="3600000"/>
+                </a:lightRig>
+              </a:scene3d>
+              <a:sp3d extrusionH="127000" prstMaterial="matte">
+                <a:bevelT w="0" h="0"/>
+                <a:bevelB w="0" h="0"/>
+              </a:sp3d>
+            </p:spPr>
+            <p:style>
+              <a:lnRef idx="2">
+                <a:schemeClr val="accent1">
+                  <a:shade val="50000"/>
+                </a:schemeClr>
+              </a:lnRef>
+              <a:fillRef idx="1">
+                <a:schemeClr val="accent1"/>
+              </a:fillRef>
+              <a:effectRef idx="0">
+                <a:schemeClr val="accent1"/>
+              </a:effectRef>
+              <a:fontRef idx="minor">
+                <a:schemeClr val="lt1"/>
+              </a:fontRef>
+            </p:style>
+            <p:txBody>
+              <a:bodyPr rtlCol="0" anchor="ctr"/>
+              <a:lstStyle/>
+              <a:p>
+                <a:pPr algn="ctr"/>
+                <a:endParaRPr lang="en-US"/>
+              </a:p>
+            </p:txBody>
+          </p:sp>
+          <p:sp>
+            <p:nvSpPr>
+              <p:cNvPr id="14" name="Rounded Rectangle 61">
+                <a:extLst>
+                  <a:ext uri="{FF2B5EF4-FFF2-40B4-BE49-F238E27FC236}">
+                    <a16:creationId xmlns:a16="http://schemas.microsoft.com/office/drawing/2014/main" id="{D32CE258-4829-AFF6-3DB5-95A488769241}"/>
+                  </a:ext>
+                </a:extLst>
+              </p:cNvPr>
+              <p:cNvSpPr/>
+              <p:nvPr/>
+            </p:nvSpPr>
+            <p:spPr>
+              <a:xfrm>
+                <a:off x="5126106" y="1266862"/>
+                <a:ext cx="685028" cy="673100"/>
+              </a:xfrm>
+              <a:prstGeom prst="roundRect">
+                <a:avLst>
+                  <a:gd name="adj" fmla="val 14402"/>
+                </a:avLst>
+              </a:prstGeom>
+              <a:solidFill>
+                <a:srgbClr val="14B1B9"/>
+              </a:solidFill>
+              <a:ln>
+                <a:noFill/>
+              </a:ln>
+              <a:effectLst>
+                <a:innerShdw dist="88900" dir="14400000">
+                  <a:schemeClr val="bg1">
+                    <a:alpha val="50000"/>
+                  </a:schemeClr>
+                </a:innerShdw>
+              </a:effectLst>
+              <a:scene3d>
+                <a:camera prst="isometricOffAxis2Top">
+                  <a:rot lat="18000000" lon="3600000" rev="18000000"/>
+                </a:camera>
+                <a:lightRig rig="soft" dir="t">
+                  <a:rot lat="0" lon="0" rev="3600000"/>
+                </a:lightRig>
+              </a:scene3d>
+              <a:sp3d prstMaterial="matte">
+                <a:bevelT w="0" h="0"/>
+                <a:bevelB w="0" h="0"/>
+              </a:sp3d>
+            </p:spPr>
+            <p:style>
+              <a:lnRef idx="2">
+                <a:schemeClr val="accent1">
+                  <a:shade val="50000"/>
+                </a:schemeClr>
+              </a:lnRef>
+              <a:fillRef idx="1">
+                <a:schemeClr val="accent1"/>
+              </a:fillRef>
+              <a:effectRef idx="0">
+                <a:schemeClr val="accent1"/>
+              </a:effectRef>
+              <a:fontRef idx="minor">
+                <a:schemeClr val="lt1"/>
+              </a:fontRef>
+            </p:style>
+            <p:txBody>
+              <a:bodyPr rtlCol="0" anchor="ctr"/>
+              <a:lstStyle/>
+              <a:p>
+                <a:pPr algn="ctr"/>
+                <a:endParaRPr lang="en-US"/>
+              </a:p>
+            </p:txBody>
+          </p:sp>
+        </p:grpSp>
+      </p:grpSp>
     </p:spTree>
     <p:extLst>
       <p:ext uri="{BB962C8B-B14F-4D97-AF65-F5344CB8AC3E}">

</xml_diff>